<commit_message>
commit) slot modal 사용
</commit_message>
<xml_diff>
--- a/front tag의 이해.pptx
+++ b/front tag의 이해.pptx
@@ -9,6 +9,7 @@
     <p:sldId id="256" r:id="rId3"/>
     <p:sldId id="259" r:id="rId4"/>
     <p:sldId id="258" r:id="rId5"/>
+    <p:sldId id="260" r:id="rId6"/>
   </p:sldIdLst>
   <p:sldSz cx="12192000" cy="6858000"/>
   <p:notesSz cx="6858000" cy="9144000"/>
@@ -107,6 +108,11 @@
       </a:defRPr>
     </a:lvl9pPr>
   </p:defaultTextStyle>
+  <p:extLst>
+    <p:ext uri="{EFAFB233-063F-42B5-8137-9DF3F51BA10A}">
+      <p15:sldGuideLst xmlns:p15="http://schemas.microsoft.com/office/powerpoint/2012/main"/>
+    </p:ext>
+  </p:extLst>
 </p:presentation>
 </file>
 
@@ -241,7 +247,7 @@
           <a:p>
             <a:fld id="{A5C728EC-8EEF-462D-AEED-3268D4773AE9}" type="datetimeFigureOut">
               <a:rPr lang="ko-KR" altLang="en-US" smtClean="0"/>
-              <a:t>2025-02-28</a:t>
+              <a:t>2025-03-06</a:t>
             </a:fld>
             <a:endParaRPr lang="ko-KR" altLang="en-US"/>
           </a:p>
@@ -411,7 +417,7 @@
           <a:p>
             <a:fld id="{A5C728EC-8EEF-462D-AEED-3268D4773AE9}" type="datetimeFigureOut">
               <a:rPr lang="ko-KR" altLang="en-US" smtClean="0"/>
-              <a:t>2025-02-28</a:t>
+              <a:t>2025-03-06</a:t>
             </a:fld>
             <a:endParaRPr lang="ko-KR" altLang="en-US"/>
           </a:p>
@@ -591,7 +597,7 @@
           <a:p>
             <a:fld id="{A5C728EC-8EEF-462D-AEED-3268D4773AE9}" type="datetimeFigureOut">
               <a:rPr lang="ko-KR" altLang="en-US" smtClean="0"/>
-              <a:t>2025-02-28</a:t>
+              <a:t>2025-03-06</a:t>
             </a:fld>
             <a:endParaRPr lang="ko-KR" altLang="en-US"/>
           </a:p>
@@ -761,7 +767,7 @@
           <a:p>
             <a:fld id="{A5C728EC-8EEF-462D-AEED-3268D4773AE9}" type="datetimeFigureOut">
               <a:rPr lang="ko-KR" altLang="en-US" smtClean="0"/>
-              <a:t>2025-02-28</a:t>
+              <a:t>2025-03-06</a:t>
             </a:fld>
             <a:endParaRPr lang="ko-KR" altLang="en-US"/>
           </a:p>
@@ -1007,7 +1013,7 @@
           <a:p>
             <a:fld id="{A5C728EC-8EEF-462D-AEED-3268D4773AE9}" type="datetimeFigureOut">
               <a:rPr lang="ko-KR" altLang="en-US" smtClean="0"/>
-              <a:t>2025-02-28</a:t>
+              <a:t>2025-03-06</a:t>
             </a:fld>
             <a:endParaRPr lang="ko-KR" altLang="en-US"/>
           </a:p>
@@ -1239,7 +1245,7 @@
           <a:p>
             <a:fld id="{A5C728EC-8EEF-462D-AEED-3268D4773AE9}" type="datetimeFigureOut">
               <a:rPr lang="ko-KR" altLang="en-US" smtClean="0"/>
-              <a:t>2025-02-28</a:t>
+              <a:t>2025-03-06</a:t>
             </a:fld>
             <a:endParaRPr lang="ko-KR" altLang="en-US"/>
           </a:p>
@@ -1606,7 +1612,7 @@
           <a:p>
             <a:fld id="{A5C728EC-8EEF-462D-AEED-3268D4773AE9}" type="datetimeFigureOut">
               <a:rPr lang="ko-KR" altLang="en-US" smtClean="0"/>
-              <a:t>2025-02-28</a:t>
+              <a:t>2025-03-06</a:t>
             </a:fld>
             <a:endParaRPr lang="ko-KR" altLang="en-US"/>
           </a:p>
@@ -1724,7 +1730,7 @@
           <a:p>
             <a:fld id="{A5C728EC-8EEF-462D-AEED-3268D4773AE9}" type="datetimeFigureOut">
               <a:rPr lang="ko-KR" altLang="en-US" smtClean="0"/>
-              <a:t>2025-02-28</a:t>
+              <a:t>2025-03-06</a:t>
             </a:fld>
             <a:endParaRPr lang="ko-KR" altLang="en-US"/>
           </a:p>
@@ -1819,7 +1825,7 @@
           <a:p>
             <a:fld id="{A5C728EC-8EEF-462D-AEED-3268D4773AE9}" type="datetimeFigureOut">
               <a:rPr lang="ko-KR" altLang="en-US" smtClean="0"/>
-              <a:t>2025-02-28</a:t>
+              <a:t>2025-03-06</a:t>
             </a:fld>
             <a:endParaRPr lang="ko-KR" altLang="en-US"/>
           </a:p>
@@ -2096,7 +2102,7 @@
           <a:p>
             <a:fld id="{A5C728EC-8EEF-462D-AEED-3268D4773AE9}" type="datetimeFigureOut">
               <a:rPr lang="ko-KR" altLang="en-US" smtClean="0"/>
-              <a:t>2025-02-28</a:t>
+              <a:t>2025-03-06</a:t>
             </a:fld>
             <a:endParaRPr lang="ko-KR" altLang="en-US"/>
           </a:p>
@@ -2349,7 +2355,7 @@
           <a:p>
             <a:fld id="{A5C728EC-8EEF-462D-AEED-3268D4773AE9}" type="datetimeFigureOut">
               <a:rPr lang="ko-KR" altLang="en-US" smtClean="0"/>
-              <a:t>2025-02-28</a:t>
+              <a:t>2025-03-06</a:t>
             </a:fld>
             <a:endParaRPr lang="ko-KR" altLang="en-US"/>
           </a:p>
@@ -2562,7 +2568,7 @@
           <a:p>
             <a:fld id="{A5C728EC-8EEF-462D-AEED-3268D4773AE9}" type="datetimeFigureOut">
               <a:rPr lang="ko-KR" altLang="en-US" smtClean="0"/>
-              <a:t>2025-02-28</a:t>
+              <a:t>2025-03-06</a:t>
             </a:fld>
             <a:endParaRPr lang="ko-KR" altLang="en-US"/>
           </a:p>
@@ -3929,11 +3935,7 @@
             </a:r>
             <a:r>
               <a:rPr lang="en-US" altLang="ko-KR" sz="1600" b="1" dirty="0" smtClean="0"/>
-              <a:t>&gt;</a:t>
-            </a:r>
-            <a:r>
-              <a:rPr lang="en-US" altLang="ko-KR" sz="1600" b="1" dirty="0" smtClean="0"/>
-              <a:t>                                                                                                           &lt;</a:t>
+              <a:t>&gt;                                                                                                           &lt;</a:t>
             </a:r>
             <a:r>
               <a:rPr lang="en-US" altLang="ko-KR" sz="1600" b="1" dirty="0" err="1" smtClean="0"/>
@@ -4109,15 +4111,7 @@
           <a:p>
             <a:r>
               <a:rPr lang="en-US" altLang="ko-KR" sz="1600" b="1" dirty="0" smtClean="0"/>
-              <a:t>&lt;td</a:t>
-            </a:r>
-            <a:r>
-              <a:rPr lang="en-US" altLang="ko-KR" sz="1600" b="1" dirty="0" smtClean="0"/>
-              <a:t>&gt;</a:t>
-            </a:r>
-            <a:r>
-              <a:rPr lang="en-US" altLang="ko-KR" sz="1600" b="1" dirty="0" smtClean="0"/>
-              <a:t>     &lt;td&gt; </a:t>
+              <a:t>&lt;td&gt;     &lt;td&gt; </a:t>
             </a:r>
             <a:endParaRPr lang="ko-KR" altLang="en-US" sz="1600" b="1" dirty="0"/>
           </a:p>
@@ -4147,15 +4141,7 @@
           <a:p>
             <a:r>
               <a:rPr lang="en-US" altLang="ko-KR" sz="1600" b="1" dirty="0" smtClean="0"/>
-              <a:t>&lt;td</a:t>
-            </a:r>
-            <a:r>
-              <a:rPr lang="en-US" altLang="ko-KR" sz="1600" b="1" dirty="0" smtClean="0"/>
-              <a:t>&gt;</a:t>
-            </a:r>
-            <a:r>
-              <a:rPr lang="en-US" altLang="ko-KR" sz="1600" b="1" dirty="0" smtClean="0"/>
-              <a:t>     &lt;td&gt; </a:t>
+              <a:t>&lt;td&gt;     &lt;td&gt; </a:t>
             </a:r>
             <a:endParaRPr lang="ko-KR" altLang="en-US" sz="1600" b="1" dirty="0"/>
           </a:p>
@@ -4185,15 +4171,7 @@
           <a:p>
             <a:r>
               <a:rPr lang="en-US" altLang="ko-KR" sz="1600" b="1" dirty="0" smtClean="0"/>
-              <a:t>&lt;td</a:t>
-            </a:r>
-            <a:r>
-              <a:rPr lang="en-US" altLang="ko-KR" sz="1600" b="1" dirty="0" smtClean="0"/>
-              <a:t>&gt;</a:t>
-            </a:r>
-            <a:r>
-              <a:rPr lang="en-US" altLang="ko-KR" sz="1600" b="1" dirty="0" smtClean="0"/>
-              <a:t>     &lt;td&gt; </a:t>
+              <a:t>&lt;td&gt;     &lt;td&gt; </a:t>
             </a:r>
             <a:endParaRPr lang="ko-KR" altLang="en-US" sz="1600" b="1" dirty="0"/>
           </a:p>
@@ -4417,11 +4395,7 @@
             </a:r>
             <a:r>
               <a:rPr lang="en-US" altLang="ko-KR" sz="1600" b="1" dirty="0" smtClean="0"/>
-              <a:t>&gt;</a:t>
-            </a:r>
-            <a:r>
-              <a:rPr lang="en-US" altLang="ko-KR" sz="1600" b="1" dirty="0" smtClean="0"/>
-              <a:t>                                                                                                       &lt;</a:t>
+              <a:t>&gt;                                                                                                       &lt;</a:t>
             </a:r>
             <a:r>
               <a:rPr lang="en-US" altLang="ko-KR" sz="1600" b="1" dirty="0" err="1" smtClean="0"/>
@@ -4459,15 +4433,7 @@
           <a:p>
             <a:r>
               <a:rPr lang="en-US" altLang="ko-KR" sz="1600" b="1" dirty="0" smtClean="0"/>
-              <a:t>&lt;td</a:t>
-            </a:r>
-            <a:r>
-              <a:rPr lang="en-US" altLang="ko-KR" sz="1600" b="1" dirty="0" smtClean="0"/>
-              <a:t>&gt;</a:t>
-            </a:r>
-            <a:r>
-              <a:rPr lang="en-US" altLang="ko-KR" sz="1600" b="1" dirty="0" smtClean="0"/>
-              <a:t>     &lt;td&gt; </a:t>
+              <a:t>&lt;td&gt;     &lt;td&gt; </a:t>
             </a:r>
             <a:endParaRPr lang="ko-KR" altLang="en-US" sz="1600" b="1" dirty="0"/>
           </a:p>
@@ -4497,15 +4463,7 @@
           <a:p>
             <a:r>
               <a:rPr lang="en-US" altLang="ko-KR" sz="1600" b="1" dirty="0" smtClean="0"/>
-              <a:t>&lt;td</a:t>
-            </a:r>
-            <a:r>
-              <a:rPr lang="en-US" altLang="ko-KR" sz="1600" b="1" dirty="0" smtClean="0"/>
-              <a:t>&gt;</a:t>
-            </a:r>
-            <a:r>
-              <a:rPr lang="en-US" altLang="ko-KR" sz="1600" b="1" dirty="0" smtClean="0"/>
-              <a:t>     &lt;td&gt; </a:t>
+              <a:t>&lt;td&gt;     &lt;td&gt; </a:t>
             </a:r>
             <a:endParaRPr lang="ko-KR" altLang="en-US" sz="1600" b="1" dirty="0"/>
           </a:p>
@@ -4535,15 +4493,7 @@
           <a:p>
             <a:r>
               <a:rPr lang="en-US" altLang="ko-KR" sz="1600" b="1" dirty="0" smtClean="0"/>
-              <a:t>&lt;td</a:t>
-            </a:r>
-            <a:r>
-              <a:rPr lang="en-US" altLang="ko-KR" sz="1600" b="1" dirty="0" smtClean="0"/>
-              <a:t>&gt;</a:t>
-            </a:r>
-            <a:r>
-              <a:rPr lang="en-US" altLang="ko-KR" sz="1600" b="1" dirty="0" smtClean="0"/>
-              <a:t>     &lt;td&gt; </a:t>
+              <a:t>&lt;td&gt;     &lt;td&gt; </a:t>
             </a:r>
             <a:endParaRPr lang="ko-KR" altLang="en-US" sz="1600" b="1" dirty="0"/>
           </a:p>
@@ -4954,11 +4904,7 @@
             </a:r>
             <a:r>
               <a:rPr lang="en-US" altLang="ko-KR" sz="1400" dirty="0" smtClean="0"/>
-              <a:t>12</a:t>
-            </a:r>
-            <a:r>
-              <a:rPr lang="en-US" altLang="ko-KR" sz="1400" dirty="0" smtClean="0"/>
-              <a:t>00</a:t>
+              <a:t>1200</a:t>
             </a:r>
             <a:r>
               <a:rPr lang="en-US" altLang="ko-KR" sz="1600" dirty="0" smtClean="0"/>
@@ -5071,11 +5017,7 @@
             </a:r>
             <a:r>
               <a:rPr lang="en-US" altLang="ko-KR" sz="1600" dirty="0" smtClean="0"/>
-              <a:t> }, {</a:t>
-            </a:r>
-            <a:r>
-              <a:rPr lang="en-US" altLang="ko-KR" sz="1600" dirty="0" smtClean="0"/>
-              <a:t>key: </a:t>
+              <a:t> }, {key: </a:t>
             </a:r>
             <a:r>
               <a:rPr lang="en-US" altLang="ko-KR" sz="1600" b="1" dirty="0" smtClean="0">
@@ -5095,15 +5037,7 @@
             </a:r>
             <a:r>
               <a:rPr lang="en-US" altLang="ko-KR" sz="1600" dirty="0" smtClean="0"/>
-              <a:t> </a:t>
-            </a:r>
-            <a:r>
-              <a:rPr lang="en-US" altLang="ko-KR" sz="1600" dirty="0" smtClean="0"/>
-              <a:t>}, {</a:t>
-            </a:r>
-            <a:r>
-              <a:rPr lang="en-US" altLang="ko-KR" sz="1600" dirty="0" smtClean="0"/>
-              <a:t>key: </a:t>
+              <a:t> }, {key: </a:t>
             </a:r>
             <a:r>
               <a:rPr lang="en-US" altLang="ko-KR" sz="1600" b="1" dirty="0" smtClean="0">
@@ -5123,11 +5057,7 @@
             </a:r>
             <a:r>
               <a:rPr lang="en-US" altLang="ko-KR" sz="1600" dirty="0" smtClean="0"/>
-              <a:t>}, {</a:t>
-            </a:r>
-            <a:r>
-              <a:rPr lang="en-US" altLang="ko-KR" sz="1600" dirty="0" smtClean="0"/>
-              <a:t>key: </a:t>
+              <a:t>}, {key: </a:t>
             </a:r>
             <a:r>
               <a:rPr lang="en-US" altLang="ko-KR" sz="1600" b="1" dirty="0" smtClean="0">
@@ -8470,11 +8400,7 @@
             </a:r>
             <a:r>
               <a:rPr lang="en-US" altLang="ko-KR" sz="1600" b="1" dirty="0" smtClean="0"/>
-              <a:t>&gt;</a:t>
-            </a:r>
-            <a:r>
-              <a:rPr lang="en-US" altLang="ko-KR" sz="1600" b="1" dirty="0" smtClean="0"/>
-              <a:t>                                                                                                           &lt;</a:t>
+              <a:t>&gt;                                                                                                           &lt;</a:t>
             </a:r>
             <a:r>
               <a:rPr lang="en-US" altLang="ko-KR" sz="1600" b="1" dirty="0" err="1" smtClean="0"/>
@@ -8650,15 +8576,7 @@
           <a:p>
             <a:r>
               <a:rPr lang="en-US" altLang="ko-KR" sz="1600" b="1" dirty="0" smtClean="0"/>
-              <a:t>&lt;td</a:t>
-            </a:r>
-            <a:r>
-              <a:rPr lang="en-US" altLang="ko-KR" sz="1600" b="1" dirty="0" smtClean="0"/>
-              <a:t>&gt;</a:t>
-            </a:r>
-            <a:r>
-              <a:rPr lang="en-US" altLang="ko-KR" sz="1600" b="1" dirty="0" smtClean="0"/>
-              <a:t>     &lt;td&gt; </a:t>
+              <a:t>&lt;td&gt;     &lt;td&gt; </a:t>
             </a:r>
             <a:endParaRPr lang="ko-KR" altLang="en-US" sz="1600" b="1" dirty="0"/>
           </a:p>
@@ -8688,15 +8606,7 @@
           <a:p>
             <a:r>
               <a:rPr lang="en-US" altLang="ko-KR" sz="1600" b="1" dirty="0" smtClean="0"/>
-              <a:t>&lt;td</a:t>
-            </a:r>
-            <a:r>
-              <a:rPr lang="en-US" altLang="ko-KR" sz="1600" b="1" dirty="0" smtClean="0"/>
-              <a:t>&gt;</a:t>
-            </a:r>
-            <a:r>
-              <a:rPr lang="en-US" altLang="ko-KR" sz="1600" b="1" dirty="0" smtClean="0"/>
-              <a:t>     &lt;td&gt; </a:t>
+              <a:t>&lt;td&gt;     &lt;td&gt; </a:t>
             </a:r>
             <a:endParaRPr lang="ko-KR" altLang="en-US" sz="1600" b="1" dirty="0"/>
           </a:p>
@@ -8726,15 +8636,7 @@
           <a:p>
             <a:r>
               <a:rPr lang="en-US" altLang="ko-KR" sz="1600" b="1" dirty="0" smtClean="0"/>
-              <a:t>&lt;td</a:t>
-            </a:r>
-            <a:r>
-              <a:rPr lang="en-US" altLang="ko-KR" sz="1600" b="1" dirty="0" smtClean="0"/>
-              <a:t>&gt;</a:t>
-            </a:r>
-            <a:r>
-              <a:rPr lang="en-US" altLang="ko-KR" sz="1600" b="1" dirty="0" smtClean="0"/>
-              <a:t>     &lt;td&gt; </a:t>
+              <a:t>&lt;td&gt;     &lt;td&gt; </a:t>
             </a:r>
             <a:endParaRPr lang="ko-KR" altLang="en-US" sz="1600" b="1" dirty="0"/>
           </a:p>
@@ -9331,11 +9233,7 @@
             </a:r>
             <a:r>
               <a:rPr lang="en-US" altLang="ko-KR" sz="1400" dirty="0" smtClean="0"/>
-              <a:t>12</a:t>
-            </a:r>
-            <a:r>
-              <a:rPr lang="en-US" altLang="ko-KR" sz="1400" dirty="0" smtClean="0"/>
-              <a:t>00</a:t>
+              <a:t>1200</a:t>
             </a:r>
             <a:r>
               <a:rPr lang="en-US" altLang="ko-KR" sz="1600" dirty="0" smtClean="0"/>
@@ -9448,11 +9346,7 @@
             </a:r>
             <a:r>
               <a:rPr lang="en-US" altLang="ko-KR" sz="1600" dirty="0" smtClean="0"/>
-              <a:t> }, {</a:t>
-            </a:r>
-            <a:r>
-              <a:rPr lang="en-US" altLang="ko-KR" sz="1600" dirty="0" smtClean="0"/>
-              <a:t>key: </a:t>
+              <a:t> }, {key: </a:t>
             </a:r>
             <a:r>
               <a:rPr lang="en-US" altLang="ko-KR" sz="1600" b="1" dirty="0" smtClean="0">
@@ -9472,15 +9366,7 @@
             </a:r>
             <a:r>
               <a:rPr lang="en-US" altLang="ko-KR" sz="1600" dirty="0" smtClean="0"/>
-              <a:t> </a:t>
-            </a:r>
-            <a:r>
-              <a:rPr lang="en-US" altLang="ko-KR" sz="1600" dirty="0" smtClean="0"/>
-              <a:t>}, {</a:t>
-            </a:r>
-            <a:r>
-              <a:rPr lang="en-US" altLang="ko-KR" sz="1600" dirty="0" smtClean="0"/>
-              <a:t>key: </a:t>
+              <a:t> }, {key: </a:t>
             </a:r>
             <a:r>
               <a:rPr lang="en-US" altLang="ko-KR" sz="1600" b="1" dirty="0" smtClean="0">
@@ -9500,11 +9386,7 @@
             </a:r>
             <a:r>
               <a:rPr lang="en-US" altLang="ko-KR" sz="1600" dirty="0" smtClean="0"/>
-              <a:t>}, {</a:t>
-            </a:r>
-            <a:r>
-              <a:rPr lang="en-US" altLang="ko-KR" sz="1600" dirty="0" smtClean="0"/>
-              <a:t>key: </a:t>
+              <a:t>}, {key: </a:t>
             </a:r>
             <a:r>
               <a:rPr lang="en-US" altLang="ko-KR" sz="1600" b="1" dirty="0" smtClean="0">
@@ -11474,6 +11356,774 @@
 </p:sld>
 </file>
 
+<file path=ppt/slides/slide5.xml><?xml version="1.0" encoding="utf-8"?>
+<p:sld xmlns:a="http://schemas.openxmlformats.org/drawingml/2006/main" xmlns:r="http://schemas.openxmlformats.org/officeDocument/2006/relationships" xmlns:p="http://schemas.openxmlformats.org/presentationml/2006/main">
+  <p:cSld>
+    <p:spTree>
+      <p:nvGrpSpPr>
+        <p:cNvPr id="1" name=""/>
+        <p:cNvGrpSpPr/>
+        <p:nvPr/>
+      </p:nvGrpSpPr>
+      <p:grpSpPr>
+        <a:xfrm>
+          <a:off x="0" y="0"/>
+          <a:ext cx="0" cy="0"/>
+          <a:chOff x="0" y="0"/>
+          <a:chExt cx="0" cy="0"/>
+        </a:xfrm>
+      </p:grpSpPr>
+      <p:sp>
+        <p:nvSpPr>
+          <p:cNvPr id="29" name="TextBox 28"/>
+          <p:cNvSpPr txBox="1"/>
+          <p:nvPr/>
+        </p:nvSpPr>
+        <p:spPr>
+          <a:xfrm>
+            <a:off x="228601" y="194965"/>
+            <a:ext cx="6207369" cy="369332"/>
+          </a:xfrm>
+          <a:prstGeom prst="rect">
+            <a:avLst/>
+          </a:prstGeom>
+          <a:noFill/>
+        </p:spPr>
+        <p:txBody>
+          <a:bodyPr wrap="square" rtlCol="0">
+            <a:spAutoFit/>
+          </a:bodyPr>
+          <a:lstStyle/>
+          <a:p>
+            <a:r>
+              <a:rPr lang="en-US" altLang="ko-KR" b="1" dirty="0" smtClean="0">
+                <a:solidFill>
+                  <a:schemeClr val="accent6">
+                    <a:lumMod val="50000"/>
+                  </a:schemeClr>
+                </a:solidFill>
+              </a:rPr>
+              <a:t>HTML – slot tag</a:t>
+            </a:r>
+            <a:endParaRPr lang="ko-KR" altLang="en-US" b="1" dirty="0">
+              <a:solidFill>
+                <a:schemeClr val="accent6">
+                  <a:lumMod val="50000"/>
+                </a:schemeClr>
+              </a:solidFill>
+            </a:endParaRPr>
+          </a:p>
+        </p:txBody>
+      </p:sp>
+      <p:sp>
+        <p:nvSpPr>
+          <p:cNvPr id="25" name="TextBox 24"/>
+          <p:cNvSpPr txBox="1"/>
+          <p:nvPr/>
+        </p:nvSpPr>
+        <p:spPr>
+          <a:xfrm>
+            <a:off x="316524" y="751693"/>
+            <a:ext cx="3015761" cy="338554"/>
+          </a:xfrm>
+          <a:prstGeom prst="rect">
+            <a:avLst/>
+          </a:prstGeom>
+          <a:noFill/>
+        </p:spPr>
+        <p:txBody>
+          <a:bodyPr wrap="square" rtlCol="0">
+            <a:spAutoFit/>
+          </a:bodyPr>
+          <a:lstStyle/>
+          <a:p>
+            <a:r>
+              <a:rPr lang="en-US" altLang="ko-KR" sz="1600" b="1" dirty="0" smtClean="0"/>
+              <a:t>Modal </a:t>
+            </a:r>
+            <a:r>
+              <a:rPr lang="ko-KR" altLang="en-US" sz="1600" b="1" dirty="0" smtClean="0"/>
+              <a:t>창 </a:t>
+            </a:r>
+            <a:r>
+              <a:rPr lang="en-US" altLang="ko-KR" sz="1600" b="1" dirty="0" smtClean="0"/>
+              <a:t>(</a:t>
+            </a:r>
+            <a:r>
+              <a:rPr lang="ko-KR" altLang="en-US" sz="1600" b="1" dirty="0" smtClean="0"/>
+              <a:t>예시</a:t>
+            </a:r>
+            <a:r>
+              <a:rPr lang="en-US" altLang="ko-KR" sz="1600" b="1" dirty="0" smtClean="0"/>
+              <a:t>)</a:t>
+            </a:r>
+            <a:endParaRPr lang="ko-KR" altLang="en-US" sz="1600" b="1" dirty="0"/>
+          </a:p>
+        </p:txBody>
+      </p:sp>
+      <p:grpSp>
+        <p:nvGrpSpPr>
+          <p:cNvPr id="28" name="그룹 27"/>
+          <p:cNvGrpSpPr/>
+          <p:nvPr/>
+        </p:nvGrpSpPr>
+        <p:grpSpPr>
+          <a:xfrm>
+            <a:off x="457200" y="1266093"/>
+            <a:ext cx="8783515" cy="4325815"/>
+            <a:chOff x="1477108" y="1591408"/>
+            <a:chExt cx="8783515" cy="4325815"/>
+          </a:xfrm>
+        </p:grpSpPr>
+        <p:sp>
+          <p:nvSpPr>
+            <p:cNvPr id="3" name="모서리가 둥근 직사각형 2"/>
+            <p:cNvSpPr/>
+            <p:nvPr/>
+          </p:nvSpPr>
+          <p:spPr>
+            <a:xfrm>
+              <a:off x="1477108" y="1591408"/>
+              <a:ext cx="8783515" cy="4325815"/>
+            </a:xfrm>
+            <a:prstGeom prst="roundRect">
+              <a:avLst>
+                <a:gd name="adj" fmla="val 6709"/>
+              </a:avLst>
+            </a:prstGeom>
+            <a:noFill/>
+            <a:ln>
+              <a:solidFill>
+                <a:srgbClr val="C00000"/>
+              </a:solidFill>
+            </a:ln>
+          </p:spPr>
+          <p:style>
+            <a:lnRef idx="2">
+              <a:schemeClr val="accent1">
+                <a:shade val="50000"/>
+              </a:schemeClr>
+            </a:lnRef>
+            <a:fillRef idx="1">
+              <a:schemeClr val="accent1"/>
+            </a:fillRef>
+            <a:effectRef idx="0">
+              <a:schemeClr val="accent1"/>
+            </a:effectRef>
+            <a:fontRef idx="minor">
+              <a:schemeClr val="lt1"/>
+            </a:fontRef>
+          </p:style>
+          <p:txBody>
+            <a:bodyPr rtlCol="0" anchor="ctr"/>
+            <a:lstStyle/>
+            <a:p>
+              <a:pPr algn="ctr"/>
+              <a:endParaRPr lang="ko-KR" altLang="en-US"/>
+            </a:p>
+          </p:txBody>
+        </p:sp>
+        <p:sp>
+          <p:nvSpPr>
+            <p:cNvPr id="26" name="직사각형 25"/>
+            <p:cNvSpPr/>
+            <p:nvPr/>
+          </p:nvSpPr>
+          <p:spPr>
+            <a:xfrm>
+              <a:off x="1855177" y="1714500"/>
+              <a:ext cx="8027377" cy="993531"/>
+            </a:xfrm>
+            <a:prstGeom prst="rect">
+              <a:avLst/>
+            </a:prstGeom>
+            <a:noFill/>
+            <a:ln>
+              <a:solidFill>
+                <a:schemeClr val="tx1"/>
+              </a:solidFill>
+            </a:ln>
+          </p:spPr>
+          <p:style>
+            <a:lnRef idx="2">
+              <a:schemeClr val="accent1">
+                <a:shade val="50000"/>
+              </a:schemeClr>
+            </a:lnRef>
+            <a:fillRef idx="1">
+              <a:schemeClr val="accent1"/>
+            </a:fillRef>
+            <a:effectRef idx="0">
+              <a:schemeClr val="accent1"/>
+            </a:effectRef>
+            <a:fontRef idx="minor">
+              <a:schemeClr val="lt1"/>
+            </a:fontRef>
+          </p:style>
+          <p:txBody>
+            <a:bodyPr rtlCol="0" anchor="ctr"/>
+            <a:lstStyle/>
+            <a:p>
+              <a:pPr algn="ctr"/>
+              <a:r>
+                <a:rPr lang="en-US" altLang="ko-KR" dirty="0" smtClean="0">
+                  <a:solidFill>
+                    <a:schemeClr val="tx1"/>
+                  </a:solidFill>
+                </a:rPr>
+                <a:t>&lt;slot&gt;&lt;/slot&gt;</a:t>
+              </a:r>
+              <a:endParaRPr lang="ko-KR" altLang="en-US" dirty="0">
+                <a:solidFill>
+                  <a:schemeClr val="tx1"/>
+                </a:solidFill>
+              </a:endParaRPr>
+            </a:p>
+          </p:txBody>
+        </p:sp>
+        <p:sp>
+          <p:nvSpPr>
+            <p:cNvPr id="33" name="직사각형 32"/>
+            <p:cNvSpPr/>
+            <p:nvPr/>
+          </p:nvSpPr>
+          <p:spPr>
+            <a:xfrm>
+              <a:off x="1855176" y="2831123"/>
+              <a:ext cx="8027377" cy="2127739"/>
+            </a:xfrm>
+            <a:prstGeom prst="rect">
+              <a:avLst/>
+            </a:prstGeom>
+            <a:noFill/>
+            <a:ln>
+              <a:solidFill>
+                <a:schemeClr val="tx1"/>
+              </a:solidFill>
+            </a:ln>
+          </p:spPr>
+          <p:style>
+            <a:lnRef idx="2">
+              <a:schemeClr val="accent1">
+                <a:shade val="50000"/>
+              </a:schemeClr>
+            </a:lnRef>
+            <a:fillRef idx="1">
+              <a:schemeClr val="accent1"/>
+            </a:fillRef>
+            <a:effectRef idx="0">
+              <a:schemeClr val="accent1"/>
+            </a:effectRef>
+            <a:fontRef idx="minor">
+              <a:schemeClr val="lt1"/>
+            </a:fontRef>
+          </p:style>
+          <p:txBody>
+            <a:bodyPr rtlCol="0" anchor="ctr"/>
+            <a:lstStyle/>
+            <a:p>
+              <a:pPr algn="ctr"/>
+              <a:r>
+                <a:rPr lang="en-US" altLang="ko-KR" dirty="0" smtClean="0">
+                  <a:solidFill>
+                    <a:schemeClr val="tx1"/>
+                  </a:solidFill>
+                </a:rPr>
+                <a:t>&lt;slot&gt;&lt;/slot&gt;</a:t>
+              </a:r>
+              <a:endParaRPr lang="ko-KR" altLang="en-US" dirty="0">
+                <a:solidFill>
+                  <a:schemeClr val="tx1"/>
+                </a:solidFill>
+              </a:endParaRPr>
+            </a:p>
+          </p:txBody>
+        </p:sp>
+        <p:sp>
+          <p:nvSpPr>
+            <p:cNvPr id="35" name="직사각형 34"/>
+            <p:cNvSpPr/>
+            <p:nvPr/>
+          </p:nvSpPr>
+          <p:spPr>
+            <a:xfrm>
+              <a:off x="1855175" y="5081954"/>
+              <a:ext cx="8027377" cy="659423"/>
+            </a:xfrm>
+            <a:prstGeom prst="rect">
+              <a:avLst/>
+            </a:prstGeom>
+            <a:noFill/>
+            <a:ln>
+              <a:solidFill>
+                <a:schemeClr val="tx1"/>
+              </a:solidFill>
+            </a:ln>
+          </p:spPr>
+          <p:style>
+            <a:lnRef idx="2">
+              <a:schemeClr val="accent1">
+                <a:shade val="50000"/>
+              </a:schemeClr>
+            </a:lnRef>
+            <a:fillRef idx="1">
+              <a:schemeClr val="accent1"/>
+            </a:fillRef>
+            <a:effectRef idx="0">
+              <a:schemeClr val="accent1"/>
+            </a:effectRef>
+            <a:fontRef idx="minor">
+              <a:schemeClr val="lt1"/>
+            </a:fontRef>
+          </p:style>
+          <p:txBody>
+            <a:bodyPr rtlCol="0" anchor="ctr"/>
+            <a:lstStyle/>
+            <a:p>
+              <a:pPr algn="ctr"/>
+              <a:r>
+                <a:rPr lang="en-US" altLang="ko-KR" dirty="0" smtClean="0">
+                  <a:solidFill>
+                    <a:schemeClr val="tx1"/>
+                  </a:solidFill>
+                </a:rPr>
+                <a:t>&lt;slot&gt;&lt;/slot&gt;</a:t>
+              </a:r>
+              <a:endParaRPr lang="ko-KR" altLang="en-US" dirty="0">
+                <a:solidFill>
+                  <a:schemeClr val="tx1"/>
+                </a:solidFill>
+              </a:endParaRPr>
+            </a:p>
+          </p:txBody>
+        </p:sp>
+      </p:grpSp>
+      <p:sp>
+        <p:nvSpPr>
+          <p:cNvPr id="27" name="TextBox 26"/>
+          <p:cNvSpPr txBox="1"/>
+          <p:nvPr/>
+        </p:nvSpPr>
+        <p:spPr>
+          <a:xfrm>
+            <a:off x="879228" y="5998518"/>
+            <a:ext cx="10559562" cy="461665"/>
+          </a:xfrm>
+          <a:prstGeom prst="rect">
+            <a:avLst/>
+          </a:prstGeom>
+          <a:noFill/>
+        </p:spPr>
+        <p:txBody>
+          <a:bodyPr wrap="square" rtlCol="0">
+            <a:spAutoFit/>
+          </a:bodyPr>
+          <a:lstStyle/>
+          <a:p>
+            <a:r>
+              <a:rPr lang="en-US" altLang="ko-KR" sz="1200" b="1" dirty="0" smtClean="0"/>
+              <a:t>Vanilla JS</a:t>
+            </a:r>
+            <a:r>
+              <a:rPr lang="ko-KR" altLang="en-US" sz="1200" b="1" dirty="0" smtClean="0"/>
+              <a:t>든</a:t>
+            </a:r>
+            <a:r>
+              <a:rPr lang="en-US" altLang="ko-KR" sz="1200" b="1" dirty="0" smtClean="0"/>
+              <a:t>, </a:t>
+            </a:r>
+            <a:r>
+              <a:rPr lang="en-US" altLang="ko-KR" sz="1200" b="1" dirty="0" err="1" smtClean="0"/>
+              <a:t>Vue</a:t>
+            </a:r>
+            <a:r>
+              <a:rPr lang="en-US" altLang="ko-KR" sz="1200" b="1" dirty="0"/>
+              <a:t> </a:t>
+            </a:r>
+            <a:r>
+              <a:rPr lang="en-US" altLang="ko-KR" sz="1200" b="1" dirty="0" smtClean="0"/>
+              <a:t>JS</a:t>
+            </a:r>
+            <a:r>
+              <a:rPr lang="ko-KR" altLang="en-US" sz="1200" b="1" dirty="0" smtClean="0"/>
+              <a:t>든 </a:t>
+            </a:r>
+            <a:r>
+              <a:rPr lang="en-US" altLang="ko-KR" sz="1200" b="1" dirty="0" smtClean="0"/>
+              <a:t>Component</a:t>
+            </a:r>
+            <a:r>
+              <a:rPr lang="ko-KR" altLang="en-US" sz="1200" b="1" dirty="0" smtClean="0"/>
+              <a:t>로 </a:t>
+            </a:r>
+            <a:r>
+              <a:rPr lang="ko-KR" altLang="en-US" sz="1200" b="1" dirty="0" err="1" smtClean="0"/>
+              <a:t>만들었을때</a:t>
+            </a:r>
+            <a:r>
+              <a:rPr lang="ko-KR" altLang="en-US" sz="1200" b="1" dirty="0" smtClean="0"/>
+              <a:t> </a:t>
+            </a:r>
+            <a:r>
+              <a:rPr lang="en-US" altLang="ko-KR" sz="1200" b="1" dirty="0" smtClean="0"/>
+              <a:t>&lt;slot&gt; tag</a:t>
+            </a:r>
+            <a:r>
+              <a:rPr lang="ko-KR" altLang="en-US" sz="1200" b="1" dirty="0" smtClean="0"/>
+              <a:t>로 비워두면 해당 </a:t>
+            </a:r>
+            <a:r>
+              <a:rPr lang="en-US" altLang="ko-KR" sz="1200" b="1" dirty="0" smtClean="0"/>
+              <a:t>slot</a:t>
+            </a:r>
+            <a:r>
+              <a:rPr lang="ko-KR" altLang="en-US" sz="1200" b="1" dirty="0" smtClean="0"/>
+              <a:t>에 다른 </a:t>
+            </a:r>
+            <a:r>
+              <a:rPr lang="en-US" altLang="ko-KR" sz="1200" b="1" dirty="0" smtClean="0"/>
+              <a:t>html</a:t>
+            </a:r>
+            <a:r>
+              <a:rPr lang="ko-KR" altLang="en-US" sz="1200" b="1" dirty="0" smtClean="0"/>
+              <a:t>요소를 부모로부터 받아서 동적으로 변경할 수 있다</a:t>
+            </a:r>
+            <a:r>
+              <a:rPr lang="en-US" altLang="ko-KR" sz="1200" b="1" dirty="0" smtClean="0"/>
+              <a:t>. </a:t>
+            </a:r>
+          </a:p>
+          <a:p>
+            <a:r>
+              <a:rPr lang="ko-KR" altLang="en-US" sz="1200" b="1" dirty="0" smtClean="0"/>
+              <a:t>그러면 그냥 </a:t>
+            </a:r>
+            <a:r>
+              <a:rPr lang="en-US" altLang="ko-KR" sz="1200" b="1" dirty="0" smtClean="0"/>
+              <a:t>component</a:t>
+            </a:r>
+            <a:r>
+              <a:rPr lang="ko-KR" altLang="en-US" sz="1200" b="1" dirty="0" smtClean="0"/>
+              <a:t>화 해서 사용하면 </a:t>
+            </a:r>
+            <a:r>
+              <a:rPr lang="ko-KR" altLang="en-US" sz="1200" b="1" dirty="0" err="1" smtClean="0"/>
+              <a:t>되는거</a:t>
+            </a:r>
+            <a:r>
+              <a:rPr lang="ko-KR" altLang="en-US" sz="1200" b="1" dirty="0" smtClean="0"/>
+              <a:t> 아닌가</a:t>
+            </a:r>
+            <a:r>
+              <a:rPr lang="en-US" altLang="ko-KR" sz="1200" b="1" dirty="0" smtClean="0"/>
+              <a:t>? </a:t>
+            </a:r>
+            <a:r>
+              <a:rPr lang="ko-KR" altLang="en-US" sz="1200" b="1" dirty="0" smtClean="0"/>
+              <a:t>그러기에는 </a:t>
+            </a:r>
+            <a:r>
+              <a:rPr lang="en-US" altLang="ko-KR" sz="1200" b="1" dirty="0" smtClean="0"/>
+              <a:t>component </a:t>
+            </a:r>
+            <a:r>
+              <a:rPr lang="ko-KR" altLang="en-US" sz="1200" b="1" dirty="0" smtClean="0"/>
+              <a:t>이름이 하드코딩되어 있어 동적으로 변경하지 못하는 케이스가 있다</a:t>
+            </a:r>
+            <a:r>
+              <a:rPr lang="en-US" altLang="ko-KR" sz="1200" b="1" dirty="0" smtClean="0"/>
+              <a:t>.</a:t>
+            </a:r>
+            <a:endParaRPr lang="ko-KR" altLang="en-US" sz="1200" b="1" dirty="0"/>
+          </a:p>
+        </p:txBody>
+      </p:sp>
+      <p:sp>
+        <p:nvSpPr>
+          <p:cNvPr id="36" name="TextBox 35"/>
+          <p:cNvSpPr txBox="1"/>
+          <p:nvPr/>
+        </p:nvSpPr>
+        <p:spPr>
+          <a:xfrm>
+            <a:off x="9433453" y="551638"/>
+            <a:ext cx="879921" cy="369332"/>
+          </a:xfrm>
+          <a:prstGeom prst="rect">
+            <a:avLst/>
+          </a:prstGeom>
+          <a:noFill/>
+        </p:spPr>
+        <p:txBody>
+          <a:bodyPr wrap="square" rtlCol="0">
+            <a:spAutoFit/>
+          </a:bodyPr>
+          <a:lstStyle/>
+          <a:p>
+            <a:r>
+              <a:rPr lang="ko-KR" altLang="en-US" dirty="0" smtClean="0"/>
+              <a:t>부모 </a:t>
+            </a:r>
+            <a:endParaRPr lang="ko-KR" altLang="en-US" dirty="0"/>
+          </a:p>
+        </p:txBody>
+      </p:sp>
+      <p:sp>
+        <p:nvSpPr>
+          <p:cNvPr id="37" name="TextBox 36"/>
+          <p:cNvSpPr txBox="1"/>
+          <p:nvPr/>
+        </p:nvSpPr>
+        <p:spPr>
+          <a:xfrm>
+            <a:off x="9759459" y="2785714"/>
+            <a:ext cx="2013441" cy="923330"/>
+          </a:xfrm>
+          <a:prstGeom prst="rect">
+            <a:avLst/>
+          </a:prstGeom>
+          <a:noFill/>
+        </p:spPr>
+        <p:txBody>
+          <a:bodyPr wrap="square" rtlCol="0">
+            <a:spAutoFit/>
+          </a:bodyPr>
+          <a:lstStyle/>
+          <a:p>
+            <a:r>
+              <a:rPr lang="en-US" altLang="ko-KR" dirty="0" smtClean="0"/>
+              <a:t>&lt;div&gt;</a:t>
+            </a:r>
+          </a:p>
+          <a:p>
+            <a:r>
+              <a:rPr lang="en-US" altLang="ko-KR" dirty="0"/>
+              <a:t> </a:t>
+            </a:r>
+            <a:r>
+              <a:rPr lang="en-US" altLang="ko-KR" dirty="0" smtClean="0"/>
+              <a:t> &lt;p&gt; Hi &lt;/p&gt;</a:t>
+            </a:r>
+          </a:p>
+          <a:p>
+            <a:r>
+              <a:rPr lang="en-US" altLang="ko-KR" dirty="0" smtClean="0"/>
+              <a:t>&lt;/div&gt;</a:t>
+            </a:r>
+            <a:endParaRPr lang="ko-KR" altLang="en-US" dirty="0"/>
+          </a:p>
+        </p:txBody>
+      </p:sp>
+      <p:cxnSp>
+        <p:nvCxnSpPr>
+          <p:cNvPr id="39" name="구부러진 연결선 38"/>
+          <p:cNvCxnSpPr>
+            <a:stCxn id="37" idx="1"/>
+          </p:cNvCxnSpPr>
+          <p:nvPr/>
+        </p:nvCxnSpPr>
+        <p:spPr>
+          <a:xfrm rot="10800000" flipV="1">
+            <a:off x="5952393" y="3247378"/>
+            <a:ext cx="3807067" cy="438831"/>
+          </a:xfrm>
+          <a:prstGeom prst="curvedConnector3">
+            <a:avLst/>
+          </a:prstGeom>
+          <a:ln>
+            <a:tailEnd type="triangle"/>
+          </a:ln>
+        </p:spPr>
+        <p:style>
+          <a:lnRef idx="1">
+            <a:schemeClr val="dk1"/>
+          </a:lnRef>
+          <a:fillRef idx="0">
+            <a:schemeClr val="dk1"/>
+          </a:fillRef>
+          <a:effectRef idx="0">
+            <a:schemeClr val="dk1"/>
+          </a:effectRef>
+          <a:fontRef idx="minor">
+            <a:schemeClr val="tx1"/>
+          </a:fontRef>
+        </p:style>
+      </p:cxnSp>
+      <p:sp>
+        <p:nvSpPr>
+          <p:cNvPr id="42" name="TextBox 41"/>
+          <p:cNvSpPr txBox="1"/>
+          <p:nvPr/>
+        </p:nvSpPr>
+        <p:spPr>
+          <a:xfrm>
+            <a:off x="9759458" y="1323967"/>
+            <a:ext cx="2013441" cy="923330"/>
+          </a:xfrm>
+          <a:prstGeom prst="rect">
+            <a:avLst/>
+          </a:prstGeom>
+          <a:noFill/>
+        </p:spPr>
+        <p:txBody>
+          <a:bodyPr wrap="square" rtlCol="0">
+            <a:spAutoFit/>
+          </a:bodyPr>
+          <a:lstStyle/>
+          <a:p>
+            <a:r>
+              <a:rPr lang="en-US" altLang="ko-KR" dirty="0" smtClean="0"/>
+              <a:t>&lt;div&gt;</a:t>
+            </a:r>
+          </a:p>
+          <a:p>
+            <a:r>
+              <a:rPr lang="en-US" altLang="ko-KR" dirty="0"/>
+              <a:t> </a:t>
+            </a:r>
+            <a:r>
+              <a:rPr lang="en-US" altLang="ko-KR" dirty="0" smtClean="0"/>
+              <a:t> &lt;p&gt; Title &lt;/p&gt;</a:t>
+            </a:r>
+          </a:p>
+          <a:p>
+            <a:r>
+              <a:rPr lang="en-US" altLang="ko-KR" dirty="0" smtClean="0"/>
+              <a:t>&lt;/div&gt;</a:t>
+            </a:r>
+            <a:endParaRPr lang="ko-KR" altLang="en-US" dirty="0"/>
+          </a:p>
+        </p:txBody>
+      </p:sp>
+      <p:sp>
+        <p:nvSpPr>
+          <p:cNvPr id="43" name="TextBox 42"/>
+          <p:cNvSpPr txBox="1"/>
+          <p:nvPr/>
+        </p:nvSpPr>
+        <p:spPr>
+          <a:xfrm>
+            <a:off x="9759458" y="4550872"/>
+            <a:ext cx="2286004" cy="923330"/>
+          </a:xfrm>
+          <a:prstGeom prst="rect">
+            <a:avLst/>
+          </a:prstGeom>
+          <a:noFill/>
+        </p:spPr>
+        <p:txBody>
+          <a:bodyPr wrap="square" rtlCol="0">
+            <a:spAutoFit/>
+          </a:bodyPr>
+          <a:lstStyle/>
+          <a:p>
+            <a:r>
+              <a:rPr lang="en-US" altLang="ko-KR" dirty="0" smtClean="0"/>
+              <a:t>&lt;div&gt;</a:t>
+            </a:r>
+          </a:p>
+          <a:p>
+            <a:r>
+              <a:rPr lang="en-US" altLang="ko-KR" dirty="0"/>
+              <a:t> </a:t>
+            </a:r>
+            <a:r>
+              <a:rPr lang="en-US" altLang="ko-KR" dirty="0" smtClean="0"/>
+              <a:t> &lt;p&gt; Footer &lt;/p&gt;</a:t>
+            </a:r>
+          </a:p>
+          <a:p>
+            <a:r>
+              <a:rPr lang="en-US" altLang="ko-KR" dirty="0" smtClean="0"/>
+              <a:t>&lt;/div&gt;</a:t>
+            </a:r>
+            <a:endParaRPr lang="ko-KR" altLang="en-US" dirty="0"/>
+          </a:p>
+        </p:txBody>
+      </p:sp>
+      <p:cxnSp>
+        <p:nvCxnSpPr>
+          <p:cNvPr id="44" name="구부러진 연결선 43"/>
+          <p:cNvCxnSpPr>
+            <a:stCxn id="43" idx="1"/>
+          </p:cNvCxnSpPr>
+          <p:nvPr/>
+        </p:nvCxnSpPr>
+        <p:spPr>
+          <a:xfrm rot="10800000" flipV="1">
+            <a:off x="5952394" y="5012536"/>
+            <a:ext cx="3807065" cy="69417"/>
+          </a:xfrm>
+          <a:prstGeom prst="curvedConnector3">
+            <a:avLst/>
+          </a:prstGeom>
+          <a:ln>
+            <a:tailEnd type="triangle"/>
+          </a:ln>
+        </p:spPr>
+        <p:style>
+          <a:lnRef idx="1">
+            <a:schemeClr val="dk1"/>
+          </a:lnRef>
+          <a:fillRef idx="0">
+            <a:schemeClr val="dk1"/>
+          </a:fillRef>
+          <a:effectRef idx="0">
+            <a:schemeClr val="dk1"/>
+          </a:effectRef>
+          <a:fontRef idx="minor">
+            <a:schemeClr val="tx1"/>
+          </a:fontRef>
+        </p:style>
+      </p:cxnSp>
+      <p:cxnSp>
+        <p:nvCxnSpPr>
+          <p:cNvPr id="47" name="구부러진 연결선 46"/>
+          <p:cNvCxnSpPr>
+            <a:stCxn id="42" idx="1"/>
+          </p:cNvCxnSpPr>
+          <p:nvPr/>
+        </p:nvCxnSpPr>
+        <p:spPr>
+          <a:xfrm rot="10800000" flipV="1">
+            <a:off x="6084278" y="1785631"/>
+            <a:ext cx="3675181" cy="183845"/>
+          </a:xfrm>
+          <a:prstGeom prst="curvedConnector3">
+            <a:avLst/>
+          </a:prstGeom>
+          <a:ln>
+            <a:tailEnd type="triangle"/>
+          </a:ln>
+        </p:spPr>
+        <p:style>
+          <a:lnRef idx="1">
+            <a:schemeClr val="dk1"/>
+          </a:lnRef>
+          <a:fillRef idx="0">
+            <a:schemeClr val="dk1"/>
+          </a:fillRef>
+          <a:effectRef idx="0">
+            <a:schemeClr val="dk1"/>
+          </a:effectRef>
+          <a:fontRef idx="minor">
+            <a:schemeClr val="tx1"/>
+          </a:fontRef>
+        </p:style>
+      </p:cxnSp>
+    </p:spTree>
+    <p:extLst>
+      <p:ext uri="{BB962C8B-B14F-4D97-AF65-F5344CB8AC3E}">
+        <p14:creationId xmlns:p14="http://schemas.microsoft.com/office/powerpoint/2010/main" val="1781203356"/>
+      </p:ext>
+    </p:extLst>
+  </p:cSld>
+  <p:clrMapOvr>
+    <a:masterClrMapping/>
+  </p:clrMapOvr>
+</p:sld>
+</file>
+
 <file path=ppt/theme/theme1.xml><?xml version="1.0" encoding="utf-8"?>
 <a:theme xmlns:a="http://schemas.openxmlformats.org/drawingml/2006/main" name="Office 테마">
   <a:themeElements>

</xml_diff>